<commit_message>
slide cập nhật lần 2 - hiền
</commit_message>
<xml_diff>
--- a/Sildewebpack.pptx
+++ b/Sildewebpack.pptx
@@ -5,7 +5,7 @@
     <p:sldMasterId id="2147483648" r:id="rId1"/>
   </p:sldMasterIdLst>
   <p:notesMasterIdLst>
-    <p:notesMasterId r:id="rId21"/>
+    <p:notesMasterId r:id="rId22"/>
   </p:notesMasterIdLst>
   <p:sldIdLst>
     <p:sldId id="256" r:id="rId2"/>
@@ -26,7 +26,8 @@
     <p:sldId id="270" r:id="rId17"/>
     <p:sldId id="274" r:id="rId18"/>
     <p:sldId id="268" r:id="rId19"/>
-    <p:sldId id="275" r:id="rId20"/>
+    <p:sldId id="277" r:id="rId20"/>
+    <p:sldId id="275" r:id="rId21"/>
   </p:sldIdLst>
   <p:sldSz cx="12192000" cy="6858000"/>
   <p:notesSz cx="6858000" cy="9144000"/>
@@ -2300,7 +2301,7 @@
           <a:p>
             <a:fld id="{6F94225C-CF81-4B28-9764-855529CC82FE}" type="slidenum">
               <a:rPr lang="vi-VN" smtClean="0"/>
-              <a:t>19</a:t>
+              <a:t>20</a:t>
             </a:fld>
             <a:endParaRPr lang="vi-VN"/>
           </a:p>
@@ -6805,7 +6806,6 @@
               <a:rPr lang="en-US" sz="2800" dirty="0" smtClean="0"/>
               <a:t>: </a:t>
             </a:r>
-            <a:endParaRPr lang="en-US" sz="2800" dirty="0" smtClean="0"/>
           </a:p>
           <a:p>
             <a:pPr algn="l"/>
@@ -7875,23 +7875,15 @@
             </a:r>
             <a:r>
               <a:rPr lang="en-US" sz="4400" dirty="0" err="1" smtClean="0"/>
-              <a:t>W</a:t>
+              <a:t>Webpack</a:t>
+            </a:r>
+            <a:r>
+              <a:rPr lang="en-US" sz="4400" dirty="0" smtClean="0"/>
+              <a:t> </a:t>
             </a:r>
             <a:r>
               <a:rPr lang="en-US" sz="4400" dirty="0" err="1" smtClean="0"/>
-              <a:t>ebpack</a:t>
-            </a:r>
-            <a:r>
-              <a:rPr lang="en-US" sz="4400" dirty="0" smtClean="0"/>
-              <a:t> </a:t>
-            </a:r>
-            <a:r>
-              <a:rPr lang="en-US" sz="4400" dirty="0" err="1" smtClean="0"/>
-              <a:t>P</a:t>
-            </a:r>
-            <a:r>
-              <a:rPr lang="en-US" sz="4400" dirty="0" err="1" smtClean="0"/>
-              <a:t>luggin</a:t>
+              <a:t>Pluggin</a:t>
             </a:r>
             <a:endParaRPr lang="en-US" sz="4400" dirty="0"/>
           </a:p>
@@ -8302,23 +8294,15 @@
             </a:r>
             <a:r>
               <a:rPr lang="en-US" sz="4400" dirty="0" err="1" smtClean="0"/>
-              <a:t>W</a:t>
+              <a:t>Webpack</a:t>
+            </a:r>
+            <a:r>
+              <a:rPr lang="en-US" sz="4400" dirty="0" smtClean="0"/>
+              <a:t> </a:t>
             </a:r>
             <a:r>
               <a:rPr lang="en-US" sz="4400" dirty="0" err="1" smtClean="0"/>
-              <a:t>ebpack</a:t>
-            </a:r>
-            <a:r>
-              <a:rPr lang="en-US" sz="4400" dirty="0" smtClean="0"/>
-              <a:t> </a:t>
-            </a:r>
-            <a:r>
-              <a:rPr lang="en-US" sz="4400" dirty="0" err="1" smtClean="0"/>
-              <a:t>P</a:t>
-            </a:r>
-            <a:r>
-              <a:rPr lang="en-US" sz="4400" dirty="0" err="1" smtClean="0"/>
-              <a:t>luggin</a:t>
+              <a:t>Pluggin</a:t>
             </a:r>
             <a:endParaRPr lang="en-US" sz="4400" dirty="0"/>
           </a:p>
@@ -8681,7 +8665,6 @@
               <a:rPr lang="en-US" dirty="0" smtClean="0"/>
               <a:t> </a:t>
             </a:r>
-            <a:endParaRPr lang="en-US" dirty="0" smtClean="0"/>
           </a:p>
           <a:p>
             <a:pPr marL="0" indent="0">
@@ -9128,7 +9111,7 @@
             <a:spLocks noGrp="1"/>
           </p:cNvSpPr>
           <p:nvPr>
-            <p:ph type="ctrTitle"/>
+            <p:ph type="title"/>
           </p:nvPr>
         </p:nvSpPr>
         <p:spPr/>
@@ -9137,8 +9120,32 @@
           <a:lstStyle/>
           <a:p>
             <a:r>
-              <a:rPr lang="en-US" dirty="0" smtClean="0"/>
-              <a:t>Thanks For Watching</a:t>
+              <a:rPr lang="en-US" dirty="0" err="1" smtClean="0"/>
+              <a:t>Tài</a:t>
+            </a:r>
+            <a:r>
+              <a:rPr lang="en-US" dirty="0" smtClean="0"/>
+              <a:t> </a:t>
+            </a:r>
+            <a:r>
+              <a:rPr lang="en-US" dirty="0" err="1" smtClean="0"/>
+              <a:t>liệu</a:t>
+            </a:r>
+            <a:r>
+              <a:rPr lang="en-US" dirty="0" smtClean="0"/>
+              <a:t> </a:t>
+            </a:r>
+            <a:r>
+              <a:rPr lang="en-US" dirty="0" err="1" smtClean="0"/>
+              <a:t>tham</a:t>
+            </a:r>
+            <a:r>
+              <a:rPr lang="en-US" dirty="0" smtClean="0"/>
+              <a:t> </a:t>
+            </a:r>
+            <a:r>
+              <a:rPr lang="en-US" dirty="0" err="1" smtClean="0"/>
+              <a:t>khảo</a:t>
             </a:r>
             <a:endParaRPr lang="en-US" dirty="0"/>
           </a:p>
@@ -9146,12 +9153,12 @@
       </p:sp>
       <p:sp>
         <p:nvSpPr>
-          <p:cNvPr id="3" name="Subtitle 2"/>
-          <p:cNvSpPr>
-            <a:spLocks noGrp="1"/>
-          </p:cNvSpPr>
-          <p:nvPr>
-            <p:ph type="subTitle" idx="1"/>
+          <p:cNvPr id="3" name="Content Placeholder 2"/>
+          <p:cNvSpPr>
+            <a:spLocks noGrp="1"/>
+          </p:cNvSpPr>
+          <p:nvPr>
+            <p:ph idx="1"/>
           </p:nvPr>
         </p:nvSpPr>
         <p:spPr/>
@@ -9159,27 +9166,70 @@
           <a:bodyPr/>
           <a:lstStyle/>
           <a:p>
-            <a:endParaRPr lang="en-US" dirty="0"/>
+            <a:r>
+              <a:rPr lang="en-US" dirty="0">
+                <a:hlinkClick r:id="rId2"/>
+              </a:rPr>
+              <a:t>https://webpack.github.io/docs/configuration.html</a:t>
+            </a:r>
+            <a:r>
+              <a:rPr lang="en-US" dirty="0"/>
+              <a:t> </a:t>
+            </a:r>
+            <a:endParaRPr lang="en-US" dirty="0" smtClean="0"/>
+          </a:p>
+          <a:p>
+            <a:r>
+              <a:rPr lang="en-US" smtClean="0">
+                <a:hlinkClick r:id="rId3"/>
+              </a:rPr>
+              <a:t>https</a:t>
+            </a:r>
+            <a:r>
+              <a:rPr lang="en-US">
+                <a:hlinkClick r:id="rId3"/>
+              </a:rPr>
+              <a:t>://scotch.io/tutorials/getting-started-with-webpack-module-bundling-magic</a:t>
+            </a:r>
+            <a:r>
+              <a:rPr lang="en-US"/>
+              <a:t> </a:t>
+            </a:r>
+            <a:endParaRPr lang="en-US" smtClean="0"/>
+          </a:p>
+          <a:p>
+            <a:r>
+              <a:rPr lang="en-US" smtClean="0">
+                <a:hlinkClick r:id="rId4"/>
+              </a:rPr>
+              <a:t>https</a:t>
+            </a:r>
+            <a:r>
+              <a:rPr lang="en-US">
+                <a:hlinkClick r:id="rId4"/>
+              </a:rPr>
+              <a:t>://medium.com/@dabit3/beginner-s-guide-to-webpack-b1f1a3638460</a:t>
+            </a:r>
+            <a:r>
+              <a:rPr lang="en-US">
+                <a:hlinkClick r:id="rId5"/>
+              </a:rPr>
+              <a:t>https://webpack.github.io/docs/what-is-webpack.html</a:t>
+            </a:r>
+            <a:endParaRPr lang="en-US"/>
           </a:p>
         </p:txBody>
       </p:sp>
     </p:spTree>
     <p:extLst>
       <p:ext uri="{BB962C8B-B14F-4D97-AF65-F5344CB8AC3E}">
-        <p14:creationId xmlns:p14="http://schemas.microsoft.com/office/powerpoint/2010/main" val="85719773"/>
+        <p14:creationId xmlns:p14="http://schemas.microsoft.com/office/powerpoint/2010/main" val="1471128869"/>
       </p:ext>
     </p:extLst>
   </p:cSld>
   <p:clrMapOvr>
     <a:masterClrMapping/>
   </p:clrMapOvr>
-  <p:timing>
-    <p:tnLst>
-      <p:par>
-        <p:cTn id="1" dur="indefinite" restart="never" nodeType="tmRoot"/>
-      </p:par>
-    </p:tnLst>
-  </p:timing>
 </p:sld>
 </file>
 
@@ -9319,6 +9369,85 @@
     <p:extLst>
       <p:ext uri="{BB962C8B-B14F-4D97-AF65-F5344CB8AC3E}">
         <p14:creationId xmlns:p14="http://schemas.microsoft.com/office/powerpoint/2010/main" val="2620969178"/>
+      </p:ext>
+    </p:extLst>
+  </p:cSld>
+  <p:clrMapOvr>
+    <a:masterClrMapping/>
+  </p:clrMapOvr>
+  <p:timing>
+    <p:tnLst>
+      <p:par>
+        <p:cTn id="1" dur="indefinite" restart="never" nodeType="tmRoot"/>
+      </p:par>
+    </p:tnLst>
+  </p:timing>
+</p:sld>
+</file>
+
+<file path=ppt/slides/slide20.xml><?xml version="1.0" encoding="utf-8"?>
+<p:sld xmlns:a="http://schemas.openxmlformats.org/drawingml/2006/main" xmlns:r="http://schemas.openxmlformats.org/officeDocument/2006/relationships" xmlns:p="http://schemas.openxmlformats.org/presentationml/2006/main">
+  <p:cSld>
+    <p:spTree>
+      <p:nvGrpSpPr>
+        <p:cNvPr id="1" name=""/>
+        <p:cNvGrpSpPr/>
+        <p:nvPr/>
+      </p:nvGrpSpPr>
+      <p:grpSpPr>
+        <a:xfrm>
+          <a:off x="0" y="0"/>
+          <a:ext cx="0" cy="0"/>
+          <a:chOff x="0" y="0"/>
+          <a:chExt cx="0" cy="0"/>
+        </a:xfrm>
+      </p:grpSpPr>
+      <p:sp>
+        <p:nvSpPr>
+          <p:cNvPr id="2" name="Title 1"/>
+          <p:cNvSpPr>
+            <a:spLocks noGrp="1"/>
+          </p:cNvSpPr>
+          <p:nvPr>
+            <p:ph type="ctrTitle"/>
+          </p:nvPr>
+        </p:nvSpPr>
+        <p:spPr/>
+        <p:txBody>
+          <a:bodyPr/>
+          <a:lstStyle/>
+          <a:p>
+            <a:r>
+              <a:rPr lang="en-US" dirty="0" smtClean="0"/>
+              <a:t>Thanks For Watching</a:t>
+            </a:r>
+            <a:endParaRPr lang="en-US" dirty="0"/>
+          </a:p>
+        </p:txBody>
+      </p:sp>
+      <p:sp>
+        <p:nvSpPr>
+          <p:cNvPr id="3" name="Subtitle 2"/>
+          <p:cNvSpPr>
+            <a:spLocks noGrp="1"/>
+          </p:cNvSpPr>
+          <p:nvPr>
+            <p:ph type="subTitle" idx="1"/>
+          </p:nvPr>
+        </p:nvSpPr>
+        <p:spPr/>
+        <p:txBody>
+          <a:bodyPr/>
+          <a:lstStyle/>
+          <a:p>
+            <a:endParaRPr lang="en-US" dirty="0"/>
+          </a:p>
+        </p:txBody>
+      </p:sp>
+    </p:spTree>
+    <p:extLst>
+      <p:ext uri="{BB962C8B-B14F-4D97-AF65-F5344CB8AC3E}">
+        <p14:creationId xmlns:p14="http://schemas.microsoft.com/office/powerpoint/2010/main" val="85719773"/>
       </p:ext>
     </p:extLst>
   </p:cSld>
@@ -9983,11 +10112,7 @@
             </a:pPr>
             <a:r>
               <a:rPr lang="en-US" sz="4500" dirty="0" smtClean="0"/>
-              <a:t>Cài đặt loader</a:t>
-            </a:r>
-            <a:r>
-              <a:rPr lang="en-US" sz="4500" dirty="0" smtClean="0"/>
-              <a:t>:</a:t>
+              <a:t>Cài đặt loader:</a:t>
             </a:r>
           </a:p>
           <a:p>
@@ -10014,15 +10139,7 @@
                   <a:srgbClr val="FF0000"/>
                 </a:solidFill>
               </a:rPr>
-              <a:t> </a:t>
-            </a:r>
-            <a:r>
-              <a:rPr lang="en-US" sz="3800" b="1" dirty="0" smtClean="0">
-                <a:solidFill>
-                  <a:srgbClr val="FF0000"/>
-                </a:solidFill>
-              </a:rPr>
-              <a:t>ý: </a:t>
+              <a:t> ý: </a:t>
             </a:r>
             <a:r>
               <a:rPr lang="en-US" sz="3800" dirty="0" smtClean="0"/>
@@ -10535,7 +10652,6 @@
               <a:rPr lang="en-US" dirty="0" smtClean="0"/>
               <a:t> </a:t>
             </a:r>
-            <a:endParaRPr lang="en-US" dirty="0" smtClean="0"/>
           </a:p>
           <a:p>
             <a:pPr marL="0" indent="0">

</xml_diff>